<commit_message>
Distinguished inside UI from core in architecture diagram
</commit_message>
<xml_diff>
--- a/Inside-Architecture.pptx
+++ b/Inside-Architecture.pptx
@@ -288,7 +288,7 @@
           <a:p>
             <a:fld id="{47B6219A-DB57-458A-B68D-C19D55E838BF}" type="datetimeFigureOut">
               <a:rPr lang="en-US" smtClean="0"/>
-              <a:t>2/4/2014</a:t>
+              <a:t>2/5/2014</a:t>
             </a:fld>
             <a:endParaRPr lang="en-US"/>
           </a:p>
@@ -458,7 +458,7 @@
           <a:p>
             <a:fld id="{47B6219A-DB57-458A-B68D-C19D55E838BF}" type="datetimeFigureOut">
               <a:rPr lang="en-US" smtClean="0"/>
-              <a:t>2/4/2014</a:t>
+              <a:t>2/5/2014</a:t>
             </a:fld>
             <a:endParaRPr lang="en-US"/>
           </a:p>
@@ -638,7 +638,7 @@
           <a:p>
             <a:fld id="{47B6219A-DB57-458A-B68D-C19D55E838BF}" type="datetimeFigureOut">
               <a:rPr lang="en-US" smtClean="0"/>
-              <a:t>2/4/2014</a:t>
+              <a:t>2/5/2014</a:t>
             </a:fld>
             <a:endParaRPr lang="en-US"/>
           </a:p>
@@ -808,7 +808,7 @@
           <a:p>
             <a:fld id="{47B6219A-DB57-458A-B68D-C19D55E838BF}" type="datetimeFigureOut">
               <a:rPr lang="en-US" smtClean="0"/>
-              <a:t>2/4/2014</a:t>
+              <a:t>2/5/2014</a:t>
             </a:fld>
             <a:endParaRPr lang="en-US"/>
           </a:p>
@@ -1054,7 +1054,7 @@
           <a:p>
             <a:fld id="{47B6219A-DB57-458A-B68D-C19D55E838BF}" type="datetimeFigureOut">
               <a:rPr lang="en-US" smtClean="0"/>
-              <a:t>2/4/2014</a:t>
+              <a:t>2/5/2014</a:t>
             </a:fld>
             <a:endParaRPr lang="en-US"/>
           </a:p>
@@ -1342,7 +1342,7 @@
           <a:p>
             <a:fld id="{47B6219A-DB57-458A-B68D-C19D55E838BF}" type="datetimeFigureOut">
               <a:rPr lang="en-US" smtClean="0"/>
-              <a:t>2/4/2014</a:t>
+              <a:t>2/5/2014</a:t>
             </a:fld>
             <a:endParaRPr lang="en-US"/>
           </a:p>
@@ -1764,7 +1764,7 @@
           <a:p>
             <a:fld id="{47B6219A-DB57-458A-B68D-C19D55E838BF}" type="datetimeFigureOut">
               <a:rPr lang="en-US" smtClean="0"/>
-              <a:t>2/4/2014</a:t>
+              <a:t>2/5/2014</a:t>
             </a:fld>
             <a:endParaRPr lang="en-US"/>
           </a:p>
@@ -1882,7 +1882,7 @@
           <a:p>
             <a:fld id="{47B6219A-DB57-458A-B68D-C19D55E838BF}" type="datetimeFigureOut">
               <a:rPr lang="en-US" smtClean="0"/>
-              <a:t>2/4/2014</a:t>
+              <a:t>2/5/2014</a:t>
             </a:fld>
             <a:endParaRPr lang="en-US"/>
           </a:p>
@@ -1977,7 +1977,7 @@
           <a:p>
             <a:fld id="{47B6219A-DB57-458A-B68D-C19D55E838BF}" type="datetimeFigureOut">
               <a:rPr lang="en-US" smtClean="0"/>
-              <a:t>2/4/2014</a:t>
+              <a:t>2/5/2014</a:t>
             </a:fld>
             <a:endParaRPr lang="en-US"/>
           </a:p>
@@ -2254,7 +2254,7 @@
           <a:p>
             <a:fld id="{47B6219A-DB57-458A-B68D-C19D55E838BF}" type="datetimeFigureOut">
               <a:rPr lang="en-US" smtClean="0"/>
-              <a:t>2/4/2014</a:t>
+              <a:t>2/5/2014</a:t>
             </a:fld>
             <a:endParaRPr lang="en-US"/>
           </a:p>
@@ -2507,7 +2507,7 @@
           <a:p>
             <a:fld id="{47B6219A-DB57-458A-B68D-C19D55E838BF}" type="datetimeFigureOut">
               <a:rPr lang="en-US" smtClean="0"/>
-              <a:t>2/4/2014</a:t>
+              <a:t>2/5/2014</a:t>
             </a:fld>
             <a:endParaRPr lang="en-US"/>
           </a:p>
@@ -2720,7 +2720,7 @@
           <a:p>
             <a:fld id="{47B6219A-DB57-458A-B68D-C19D55E838BF}" type="datetimeFigureOut">
               <a:rPr lang="en-US" smtClean="0"/>
-              <a:t>2/4/2014</a:t>
+              <a:t>2/5/2014</a:t>
             </a:fld>
             <a:endParaRPr lang="en-US"/>
           </a:p>
@@ -3201,8 +3201,8 @@
         </p:nvSpPr>
         <p:spPr>
           <a:xfrm>
-            <a:off x="3200400" y="685800"/>
-            <a:ext cx="1905000" cy="4248150"/>
+            <a:off x="3200400" y="685799"/>
+            <a:ext cx="1905000" cy="2757451"/>
           </a:xfrm>
           <a:prstGeom prst="roundRect">
             <a:avLst>
@@ -3242,63 +3242,6 @@
       </p:sp>
       <p:sp>
         <p:nvSpPr>
-          <p:cNvPr id="11" name="Rounded Rectangle 10"/>
-          <p:cNvSpPr/>
-          <p:nvPr/>
-        </p:nvSpPr>
-        <p:spPr>
-          <a:xfrm>
-            <a:off x="3352800" y="3867150"/>
-            <a:ext cx="1600200" cy="914400"/>
-          </a:xfrm>
-          <a:prstGeom prst="roundRect">
-            <a:avLst>
-              <a:gd name="adj" fmla="val 6667"/>
-            </a:avLst>
-          </a:prstGeom>
-          <a:ln/>
-        </p:spPr>
-        <p:style>
-          <a:lnRef idx="2">
-            <a:schemeClr val="accent1"/>
-          </a:lnRef>
-          <a:fillRef idx="1">
-            <a:schemeClr val="lt1"/>
-          </a:fillRef>
-          <a:effectRef idx="0">
-            <a:schemeClr val="accent1"/>
-          </a:effectRef>
-          <a:fontRef idx="minor">
-            <a:schemeClr val="dk1"/>
-          </a:fontRef>
-        </p:style>
-        <p:txBody>
-          <a:bodyPr rtlCol="0" anchor="t" anchorCtr="0"/>
-          <a:lstStyle/>
-          <a:p>
-            <a:pPr algn="ctr"/>
-            <a:r>
-              <a:rPr lang="en-US" sz="1600" dirty="0" smtClean="0">
-                <a:solidFill>
-                  <a:schemeClr val="accent3">
-                    <a:lumMod val="50000"/>
-                  </a:schemeClr>
-                </a:solidFill>
-              </a:rPr>
-              <a:t>Android Native</a:t>
-            </a:r>
-            <a:endParaRPr lang="en-US" sz="1600" dirty="0">
-              <a:solidFill>
-                <a:schemeClr val="accent3">
-                  <a:lumMod val="50000"/>
-                </a:schemeClr>
-              </a:solidFill>
-            </a:endParaRPr>
-          </a:p>
-        </p:txBody>
-      </p:sp>
-      <p:sp>
-        <p:nvSpPr>
           <p:cNvPr id="13" name="Rounded Rectangle 12"/>
           <p:cNvSpPr/>
           <p:nvPr/>
@@ -3405,7 +3348,27 @@
                   </a:schemeClr>
                 </a:solidFill>
               </a:rPr>
-              <a:t>(e.g., Algorithms, Branding, People, Forms, Visualizations)</a:t>
+              <a:t>(e.g., Algorithms, </a:t>
+            </a:r>
+            <a:r>
+              <a:rPr lang="en-US" sz="1200" dirty="0" smtClean="0">
+                <a:solidFill>
+                  <a:schemeClr val="accent3">
+                    <a:lumMod val="50000"/>
+                  </a:schemeClr>
+                </a:solidFill>
+              </a:rPr>
+              <a:t>Themes, </a:t>
+            </a:r>
+            <a:r>
+              <a:rPr lang="en-US" sz="1200" dirty="0" smtClean="0">
+                <a:solidFill>
+                  <a:schemeClr val="accent3">
+                    <a:lumMod val="50000"/>
+                  </a:schemeClr>
+                </a:solidFill>
+              </a:rPr>
+              <a:t>People, Forms, Visualizations)</a:t>
             </a:r>
           </a:p>
         </p:txBody>
@@ -3418,8 +3381,8 @@
         </p:nvSpPr>
         <p:spPr>
           <a:xfrm>
-            <a:off x="655481" y="1543050"/>
-            <a:ext cx="823041" cy="725168"/>
+            <a:off x="442040" y="1428750"/>
+            <a:ext cx="1173319" cy="725168"/>
           </a:xfrm>
           <a:prstGeom prst="roundRect">
             <a:avLst/>
@@ -3746,7 +3709,7 @@
         </p:nvSpPr>
         <p:spPr>
           <a:xfrm>
-            <a:off x="1828800" y="2457450"/>
+            <a:off x="1828800" y="3143250"/>
             <a:ext cx="762000" cy="495300"/>
           </a:xfrm>
           <a:prstGeom prst="roundRect">
@@ -3769,10 +3732,30 @@
           </a:fontRef>
         </p:style>
         <p:txBody>
-          <a:bodyPr rtlCol="0" anchor="t" anchorCtr="0"/>
+          <a:bodyPr lIns="45720" rIns="45720" rtlCol="0" anchor="t" anchorCtr="0"/>
           <a:lstStyle/>
           <a:p>
             <a:pPr algn="ctr"/>
+            <a:r>
+              <a:rPr lang="en-US" sz="1100" dirty="0" smtClean="0">
+                <a:solidFill>
+                  <a:schemeClr val="accent3">
+                    <a:lumMod val="50000"/>
+                  </a:schemeClr>
+                </a:solidFill>
+              </a:rPr>
+              <a:t>Inside </a:t>
+            </a:r>
+            <a:r>
+              <a:rPr lang="en-US" sz="1100" dirty="0" smtClean="0">
+                <a:solidFill>
+                  <a:schemeClr val="accent3">
+                    <a:lumMod val="50000"/>
+                  </a:schemeClr>
+                </a:solidFill>
+              </a:rPr>
+              <a:t>UI Angular</a:t>
+            </a:r>
             <a:endParaRPr lang="en-US" sz="1100" dirty="0">
               <a:solidFill>
                 <a:schemeClr val="accent3">
@@ -3785,58 +3768,13 @@
       </p:sp>
       <p:sp>
         <p:nvSpPr>
-          <p:cNvPr id="22" name="Rounded Rectangle 21"/>
-          <p:cNvSpPr/>
-          <p:nvPr/>
-        </p:nvSpPr>
-        <p:spPr>
-          <a:xfrm>
-            <a:off x="1828800" y="3143250"/>
-            <a:ext cx="762000" cy="495300"/>
-          </a:xfrm>
-          <a:prstGeom prst="roundRect">
-            <a:avLst/>
-          </a:prstGeom>
-          <a:ln/>
-        </p:spPr>
-        <p:style>
-          <a:lnRef idx="2">
-            <a:schemeClr val="accent1"/>
-          </a:lnRef>
-          <a:fillRef idx="1">
-            <a:schemeClr val="lt1"/>
-          </a:fillRef>
-          <a:effectRef idx="0">
-            <a:schemeClr val="accent1"/>
-          </a:effectRef>
-          <a:fontRef idx="minor">
-            <a:schemeClr val="dk1"/>
-          </a:fontRef>
-        </p:style>
-        <p:txBody>
-          <a:bodyPr rtlCol="0" anchor="t" anchorCtr="0"/>
-          <a:lstStyle/>
-          <a:p>
-            <a:pPr algn="ctr"/>
-            <a:endParaRPr lang="en-US" sz="1100" dirty="0">
-              <a:solidFill>
-                <a:schemeClr val="accent3">
-                  <a:lumMod val="50000"/>
-                </a:schemeClr>
-              </a:solidFill>
-            </a:endParaRPr>
-          </a:p>
-        </p:txBody>
-      </p:sp>
-      <p:sp>
-        <p:nvSpPr>
           <p:cNvPr id="23" name="Rounded Rectangle 22"/>
           <p:cNvSpPr/>
           <p:nvPr/>
         </p:nvSpPr>
         <p:spPr>
           <a:xfrm>
-            <a:off x="503081" y="2342516"/>
+            <a:off x="442040" y="2228216"/>
             <a:ext cx="1173319" cy="534034"/>
           </a:xfrm>
           <a:prstGeom prst="roundRect">
@@ -3902,7 +3840,7 @@
         </p:nvSpPr>
         <p:spPr>
           <a:xfrm>
-            <a:off x="503081" y="2952750"/>
+            <a:off x="442040" y="2838450"/>
             <a:ext cx="1173319" cy="304800"/>
           </a:xfrm>
           <a:prstGeom prst="roundRect">
@@ -3999,7 +3937,7 @@
         <p:spPr>
           <a:xfrm>
             <a:off x="2590800" y="2257352"/>
-            <a:ext cx="609600" cy="2371798"/>
+            <a:ext cx="609600" cy="1075643"/>
           </a:xfrm>
           <a:prstGeom prst="line">
             <a:avLst/>
@@ -4020,53 +3958,135 @@
           </a:fontRef>
         </p:style>
       </p:cxnSp>
-      <p:sp>
-        <p:nvSpPr>
-          <p:cNvPr id="36" name="TextBox 35"/>
-          <p:cNvSpPr txBox="1"/>
+      <p:grpSp>
+        <p:nvGrpSpPr>
+          <p:cNvPr id="2" name="Group 1"/>
+          <p:cNvGrpSpPr/>
           <p:nvPr/>
-        </p:nvSpPr>
-        <p:spPr>
+        </p:nvGrpSpPr>
+        <p:grpSpPr>
           <a:xfrm>
-            <a:off x="3344123" y="4135219"/>
-            <a:ext cx="1487908" cy="646331"/>
-          </a:xfrm>
-          <a:prstGeom prst="rect">
-            <a:avLst/>
-          </a:prstGeom>
-          <a:noFill/>
-        </p:spPr>
-        <p:txBody>
-          <a:bodyPr wrap="none" rtlCol="0">
-            <a:spAutoFit/>
-          </a:bodyPr>
-          <a:lstStyle/>
-          <a:p>
-            <a:r>
-              <a:rPr lang="en-US" sz="900" dirty="0" smtClean="0"/>
-              <a:t>Scheduler</a:t>
-            </a:r>
-          </a:p>
-          <a:p>
-            <a:r>
-              <a:rPr lang="en-US" sz="900" dirty="0" smtClean="0"/>
-              <a:t>Collect sensor data</a:t>
-            </a:r>
-          </a:p>
-          <a:p>
-            <a:r>
-              <a:rPr lang="en-US" sz="900" dirty="0" smtClean="0"/>
-              <a:t>Send sensor data to server</a:t>
-            </a:r>
-          </a:p>
-          <a:p>
-            <a:r>
-              <a:rPr lang="en-US" sz="900" dirty="0" smtClean="0"/>
-              <a:t>Send settings data to server</a:t>
-            </a:r>
-          </a:p>
-        </p:txBody>
-      </p:sp>
+            <a:off x="3352801" y="2379697"/>
+            <a:ext cx="1600200" cy="914400"/>
+            <a:chOff x="3344123" y="3867150"/>
+            <a:chExt cx="1608877" cy="914400"/>
+          </a:xfrm>
+        </p:grpSpPr>
+        <p:sp>
+          <p:nvSpPr>
+            <p:cNvPr id="11" name="Rounded Rectangle 10"/>
+            <p:cNvSpPr/>
+            <p:nvPr/>
+          </p:nvSpPr>
+          <p:spPr>
+            <a:xfrm>
+              <a:off x="3352800" y="3867150"/>
+              <a:ext cx="1600200" cy="914400"/>
+            </a:xfrm>
+            <a:prstGeom prst="roundRect">
+              <a:avLst>
+                <a:gd name="adj" fmla="val 6667"/>
+              </a:avLst>
+            </a:prstGeom>
+            <a:ln/>
+          </p:spPr>
+          <p:style>
+            <a:lnRef idx="2">
+              <a:schemeClr val="accent1"/>
+            </a:lnRef>
+            <a:fillRef idx="1">
+              <a:schemeClr val="lt1"/>
+            </a:fillRef>
+            <a:effectRef idx="0">
+              <a:schemeClr val="accent1"/>
+            </a:effectRef>
+            <a:fontRef idx="minor">
+              <a:schemeClr val="dk1"/>
+            </a:fontRef>
+          </p:style>
+          <p:txBody>
+            <a:bodyPr rtlCol="0" anchor="t" anchorCtr="0"/>
+            <a:lstStyle/>
+            <a:p>
+              <a:pPr algn="ctr"/>
+              <a:r>
+                <a:rPr lang="en-US" sz="1400" dirty="0" smtClean="0">
+                  <a:solidFill>
+                    <a:schemeClr val="accent1">
+                      <a:lumMod val="75000"/>
+                    </a:schemeClr>
+                  </a:solidFill>
+                </a:rPr>
+                <a:t>Android</a:t>
+              </a:r>
+              <a:r>
+                <a:rPr lang="en-US" sz="1600" dirty="0" smtClean="0">
+                  <a:solidFill>
+                    <a:schemeClr val="accent1">
+                      <a:lumMod val="75000"/>
+                    </a:schemeClr>
+                  </a:solidFill>
+                </a:rPr>
+                <a:t> Native</a:t>
+              </a:r>
+              <a:endParaRPr lang="en-US" sz="1600" dirty="0">
+                <a:solidFill>
+                  <a:schemeClr val="accent1">
+                    <a:lumMod val="75000"/>
+                  </a:schemeClr>
+                </a:solidFill>
+              </a:endParaRPr>
+            </a:p>
+          </p:txBody>
+        </p:sp>
+        <p:sp>
+          <p:nvSpPr>
+            <p:cNvPr id="36" name="TextBox 35"/>
+            <p:cNvSpPr txBox="1"/>
+            <p:nvPr/>
+          </p:nvSpPr>
+          <p:spPr>
+            <a:xfrm>
+              <a:off x="3344123" y="4135219"/>
+              <a:ext cx="1487908" cy="646331"/>
+            </a:xfrm>
+            <a:prstGeom prst="rect">
+              <a:avLst/>
+            </a:prstGeom>
+            <a:noFill/>
+          </p:spPr>
+          <p:txBody>
+            <a:bodyPr wrap="none" rtlCol="0">
+              <a:spAutoFit/>
+            </a:bodyPr>
+            <a:lstStyle/>
+            <a:p>
+              <a:r>
+                <a:rPr lang="en-US" sz="900" dirty="0" smtClean="0"/>
+                <a:t>Scheduler</a:t>
+              </a:r>
+            </a:p>
+            <a:p>
+              <a:r>
+                <a:rPr lang="en-US" sz="900" dirty="0" smtClean="0"/>
+                <a:t>Collect sensor data</a:t>
+              </a:r>
+            </a:p>
+            <a:p>
+              <a:r>
+                <a:rPr lang="en-US" sz="900" dirty="0" smtClean="0"/>
+                <a:t>Send sensor data to server</a:t>
+              </a:r>
+            </a:p>
+            <a:p>
+              <a:r>
+                <a:rPr lang="en-US" sz="900" dirty="0" smtClean="0"/>
+                <a:t>Send settings data to server</a:t>
+              </a:r>
+            </a:p>
+          </p:txBody>
+        </p:sp>
+      </p:grpSp>
       <p:sp>
         <p:nvSpPr>
           <p:cNvPr id="40" name="Rounded Rectangle 39"/>
@@ -4075,11 +4095,13 @@
         </p:nvSpPr>
         <p:spPr>
           <a:xfrm>
-            <a:off x="5105400" y="3482574"/>
-            <a:ext cx="1143000" cy="311199"/>
+            <a:off x="5105400" y="2249488"/>
+            <a:ext cx="1143000" cy="274320"/>
           </a:xfrm>
           <a:prstGeom prst="roundRect">
-            <a:avLst/>
+            <a:avLst>
+              <a:gd name="adj" fmla="val 50000"/>
+            </a:avLst>
           </a:prstGeom>
           <a:ln/>
         </p:spPr>
@@ -4098,7 +4120,7 @@
           </a:fontRef>
         </p:style>
         <p:txBody>
-          <a:bodyPr rtlCol="0" anchor="t" anchorCtr="0"/>
+          <a:bodyPr lIns="45720" rIns="45720" rtlCol="0" anchor="ctr" anchorCtr="0"/>
           <a:lstStyle/>
           <a:p>
             <a:pPr algn="ctr"/>
@@ -4130,11 +4152,13 @@
         </p:nvSpPr>
         <p:spPr>
           <a:xfrm>
-            <a:off x="5105400" y="1581150"/>
-            <a:ext cx="1143000" cy="324484"/>
+            <a:off x="5105400" y="725488"/>
+            <a:ext cx="1143000" cy="274320"/>
           </a:xfrm>
           <a:prstGeom prst="roundRect">
-            <a:avLst/>
+            <a:avLst>
+              <a:gd name="adj" fmla="val 50000"/>
+            </a:avLst>
           </a:prstGeom>
           <a:ln/>
         </p:spPr>
@@ -4153,7 +4177,7 @@
           </a:fontRef>
         </p:style>
         <p:txBody>
-          <a:bodyPr rtlCol="0" anchor="t" anchorCtr="0"/>
+          <a:bodyPr lIns="45720" rIns="45720" rtlCol="0" anchor="ctr" anchorCtr="0"/>
           <a:lstStyle/>
           <a:p>
             <a:pPr algn="ctr"/>
@@ -4185,11 +4209,13 @@
         </p:nvSpPr>
         <p:spPr>
           <a:xfrm>
-            <a:off x="5105400" y="3943350"/>
-            <a:ext cx="1143000" cy="914399"/>
+            <a:off x="5105400" y="2630487"/>
+            <a:ext cx="1143000" cy="779463"/>
           </a:xfrm>
           <a:prstGeom prst="roundRect">
-            <a:avLst/>
+            <a:avLst>
+              <a:gd name="adj" fmla="val 19167"/>
+            </a:avLst>
           </a:prstGeom>
           <a:ln/>
         </p:spPr>
@@ -4208,7 +4234,7 @@
           </a:fontRef>
         </p:style>
         <p:txBody>
-          <a:bodyPr rtlCol="0" anchor="t" anchorCtr="0"/>
+          <a:bodyPr lIns="45720" rIns="45720" rtlCol="0" anchor="ctr" anchorCtr="0"/>
           <a:lstStyle/>
           <a:p>
             <a:pPr algn="ctr"/>
@@ -4246,8 +4272,8 @@
         </p:nvSpPr>
         <p:spPr>
           <a:xfrm>
-            <a:off x="5181600" y="249019"/>
-            <a:ext cx="990600" cy="646331"/>
+            <a:off x="4876800" y="249019"/>
+            <a:ext cx="1600200" cy="369332"/>
           </a:xfrm>
           <a:prstGeom prst="rect">
             <a:avLst/>
@@ -4288,8 +4314,8 @@
         </p:nvCxnSpPr>
         <p:spPr>
           <a:xfrm flipV="1">
-            <a:off x="6248400" y="858620"/>
-            <a:ext cx="381000" cy="722530"/>
+            <a:off x="6172200" y="685800"/>
+            <a:ext cx="764414" cy="39688"/>
           </a:xfrm>
           <a:prstGeom prst="line">
             <a:avLst/>
@@ -4318,8 +4344,8 @@
         </p:nvCxnSpPr>
         <p:spPr>
           <a:xfrm>
-            <a:off x="6248400" y="1905634"/>
-            <a:ext cx="304800" cy="2647316"/>
+            <a:off x="6172200" y="971550"/>
+            <a:ext cx="381000" cy="3581400"/>
           </a:xfrm>
           <a:prstGeom prst="line">
             <a:avLst/>
@@ -4348,8 +4374,8 @@
         </p:nvSpPr>
         <p:spPr>
           <a:xfrm>
-            <a:off x="5181600" y="895350"/>
-            <a:ext cx="990600" cy="646331"/>
+            <a:off x="5105400" y="3524016"/>
+            <a:ext cx="1143000" cy="507831"/>
           </a:xfrm>
           <a:prstGeom prst="rect">
             <a:avLst/>
@@ -4432,11 +4458,13 @@
         </p:nvSpPr>
         <p:spPr>
           <a:xfrm>
-            <a:off x="5105400" y="3005925"/>
-            <a:ext cx="1143000" cy="327070"/>
+            <a:off x="5105400" y="1868488"/>
+            <a:ext cx="1143000" cy="274320"/>
           </a:xfrm>
           <a:prstGeom prst="roundRect">
-            <a:avLst/>
+            <a:avLst>
+              <a:gd name="adj" fmla="val 50000"/>
+            </a:avLst>
           </a:prstGeom>
           <a:solidFill>
             <a:schemeClr val="bg1"/>
@@ -4458,7 +4486,7 @@
           </a:fontRef>
         </p:style>
         <p:txBody>
-          <a:bodyPr rtlCol="0" anchor="t" anchorCtr="0"/>
+          <a:bodyPr lIns="45720" rIns="45720" rtlCol="0" anchor="ctr" anchorCtr="0"/>
           <a:lstStyle/>
           <a:p>
             <a:pPr algn="ctr"/>
@@ -4490,7 +4518,7 @@
         </p:nvSpPr>
         <p:spPr>
           <a:xfrm>
-            <a:off x="3352800" y="2379697"/>
+            <a:off x="3352800" y="3559174"/>
             <a:ext cx="1600200" cy="1351916"/>
           </a:xfrm>
           <a:prstGeom prst="roundRect">
@@ -4520,19 +4548,19 @@
           <a:p>
             <a:pPr algn="ctr"/>
             <a:r>
-              <a:rPr lang="en-US" sz="1600" dirty="0" smtClean="0">
-                <a:solidFill>
-                  <a:schemeClr val="accent3">
-                    <a:lumMod val="50000"/>
+              <a:rPr lang="en-US" sz="1400" dirty="0" smtClean="0">
+                <a:solidFill>
+                  <a:schemeClr val="accent1">
+                    <a:lumMod val="75000"/>
                   </a:schemeClr>
                 </a:solidFill>
               </a:rPr>
-              <a:t>Web Front-End</a:t>
-            </a:r>
-            <a:endParaRPr lang="en-US" sz="1600" dirty="0">
+              <a:t>Inside UI: Angular</a:t>
+            </a:r>
+            <a:endParaRPr lang="en-US" sz="1400" dirty="0">
               <a:solidFill>
-                <a:schemeClr val="accent3">
-                  <a:lumMod val="50000"/>
+                <a:schemeClr val="accent1">
+                  <a:lumMod val="75000"/>
                 </a:schemeClr>
               </a:solidFill>
             </a:endParaRPr>
@@ -4547,8 +4575,8 @@
         </p:nvSpPr>
         <p:spPr>
           <a:xfrm>
-            <a:off x="3352800" y="2719060"/>
-            <a:ext cx="1651414" cy="923330"/>
+            <a:off x="3352800" y="3858220"/>
+            <a:ext cx="1590500" cy="1061829"/>
           </a:xfrm>
           <a:prstGeom prst="rect">
             <a:avLst/>
@@ -4569,13 +4597,40 @@
           <a:p>
             <a:r>
               <a:rPr lang="en-US" sz="900" dirty="0" smtClean="0"/>
-              <a:t>A default web app UI layout for</a:t>
-            </a:r>
-          </a:p>
-          <a:p>
+              <a:t>A default </a:t>
+            </a:r>
             <a:r>
               <a:rPr lang="en-US" sz="900" dirty="0" smtClean="0"/>
-              <a:t>fast Inside app/plugin dev.</a:t>
+              <a:t>, </a:t>
+            </a:r>
+            <a:r>
+              <a:rPr lang="en-US" sz="900" dirty="0" err="1" smtClean="0"/>
+              <a:t>themeable</a:t>
+            </a:r>
+            <a:r>
+              <a:rPr lang="en-US" sz="900" dirty="0" smtClean="0"/>
+              <a:t>, web UI</a:t>
+            </a:r>
+            <a:endParaRPr lang="en-US" sz="900" dirty="0" smtClean="0"/>
+          </a:p>
+          <a:p>
+            <a:r>
+              <a:rPr lang="en-US" sz="900" dirty="0" smtClean="0"/>
+              <a:t>for fast </a:t>
+            </a:r>
+            <a:r>
+              <a:rPr lang="en-US" sz="900" dirty="0" smtClean="0"/>
+              <a:t>Inside app/plugin dev.</a:t>
+            </a:r>
+          </a:p>
+          <a:p>
+            <a:r>
+              <a:rPr lang="en-US" sz="900" dirty="0" smtClean="0"/>
+              <a:t>Plugin </a:t>
+            </a:r>
+            <a:r>
+              <a:rPr lang="en-US" sz="900" dirty="0" smtClean="0"/>
+              <a:t>market exploring</a:t>
             </a:r>
           </a:p>
           <a:p>
@@ -4588,7 +4643,7 @@
           <a:p>
             <a:r>
               <a:rPr lang="en-US" sz="900" dirty="0" smtClean="0"/>
-              <a:t>Plugin settings </a:t>
+              <a:t>Settings </a:t>
             </a:r>
             <a:r>
               <a:rPr lang="en-US" sz="900" dirty="0" err="1" smtClean="0"/>
@@ -4599,11 +4654,7 @@
           <a:p>
             <a:r>
               <a:rPr lang="en-US" sz="900" dirty="0" smtClean="0"/>
-              <a:t>App </a:t>
-            </a:r>
-            <a:r>
-              <a:rPr lang="en-US" sz="900" dirty="0" smtClean="0"/>
-              <a:t>settings </a:t>
+              <a:t>People </a:t>
             </a:r>
             <a:r>
               <a:rPr lang="en-US" sz="900" dirty="0" err="1" smtClean="0"/>
@@ -4651,19 +4702,39 @@
           <a:p>
             <a:pPr algn="ctr"/>
             <a:r>
+              <a:rPr lang="en-US" sz="1400" dirty="0" smtClean="0">
+                <a:solidFill>
+                  <a:schemeClr val="accent1">
+                    <a:lumMod val="75000"/>
+                  </a:schemeClr>
+                </a:solidFill>
+              </a:rPr>
+              <a:t>Web</a:t>
+            </a:r>
+            <a:r>
               <a:rPr lang="en-US" sz="1600" dirty="0" smtClean="0">
                 <a:solidFill>
-                  <a:schemeClr val="accent3">
-                    <a:lumMod val="50000"/>
+                  <a:schemeClr val="accent1">
+                    <a:lumMod val="75000"/>
                   </a:schemeClr>
                 </a:solidFill>
               </a:rPr>
-              <a:t>Web Back-end</a:t>
-            </a:r>
-            <a:endParaRPr lang="en-US" sz="1600" dirty="0">
+              <a:t> </a:t>
+            </a:r>
+            <a:r>
+              <a:rPr lang="en-US" sz="1400" dirty="0" smtClean="0">
+                <a:solidFill>
+                  <a:schemeClr val="accent1">
+                    <a:lumMod val="75000"/>
+                  </a:schemeClr>
+                </a:solidFill>
+              </a:rPr>
+              <a:t>Back-end</a:t>
+            </a:r>
+            <a:endParaRPr lang="en-US" sz="1400" dirty="0">
               <a:solidFill>
-                <a:schemeClr val="accent3">
-                  <a:lumMod val="50000"/>
+                <a:schemeClr val="accent1">
+                  <a:lumMod val="75000"/>
                 </a:schemeClr>
               </a:solidFill>
             </a:endParaRPr>
@@ -4717,21 +4788,17 @@
           <a:p>
             <a:r>
               <a:rPr lang="en-US" sz="900" dirty="0" smtClean="0"/>
-              <a:t>Sensor data </a:t>
-            </a:r>
+              <a:t>Sensor data create</a:t>
+            </a:r>
+          </a:p>
+          <a:p>
             <a:r>
               <a:rPr lang="en-US" sz="900" dirty="0" smtClean="0"/>
-              <a:t>create</a:t>
-            </a:r>
-          </a:p>
-          <a:p>
-            <a:r>
-              <a:rPr lang="en-US" sz="900" dirty="0" err="1" smtClean="0"/>
               <a:t>Auth</a:t>
             </a:r>
             <a:r>
               <a:rPr lang="en-US" sz="900" dirty="0" smtClean="0"/>
-              <a:t>?</a:t>
+              <a:t>orization/Authentication</a:t>
             </a:r>
             <a:endParaRPr lang="en-US" sz="900" dirty="0" smtClean="0"/>
           </a:p>
@@ -4745,11 +4812,13 @@
         </p:nvSpPr>
         <p:spPr>
           <a:xfrm>
-            <a:off x="5105400" y="2529276"/>
-            <a:ext cx="1143000" cy="327070"/>
+            <a:off x="5105400" y="1487488"/>
+            <a:ext cx="1143000" cy="274320"/>
           </a:xfrm>
           <a:prstGeom prst="roundRect">
-            <a:avLst/>
+            <a:avLst>
+              <a:gd name="adj" fmla="val 50000"/>
+            </a:avLst>
           </a:prstGeom>
           <a:solidFill>
             <a:schemeClr val="bg1"/>
@@ -4771,7 +4840,7 @@
           </a:fontRef>
         </p:style>
         <p:txBody>
-          <a:bodyPr rtlCol="0" anchor="t" anchorCtr="0"/>
+          <a:bodyPr lIns="45720" rIns="45720" rtlCol="0" anchor="ctr" anchorCtr="0"/>
           <a:lstStyle/>
           <a:p>
             <a:pPr algn="ctr"/>
@@ -4783,7 +4852,7 @@
                   </a:schemeClr>
                 </a:solidFill>
               </a:rPr>
-              <a:t>Branding</a:t>
+              <a:t>Themes</a:t>
             </a:r>
             <a:endParaRPr lang="en-US" sz="1100" dirty="0">
               <a:solidFill>
@@ -4803,11 +4872,13 @@
         </p:nvSpPr>
         <p:spPr>
           <a:xfrm>
-            <a:off x="5105400" y="2055213"/>
-            <a:ext cx="1143000" cy="324484"/>
+            <a:off x="5105400" y="1106488"/>
+            <a:ext cx="1143000" cy="274320"/>
           </a:xfrm>
           <a:prstGeom prst="roundRect">
-            <a:avLst/>
+            <a:avLst>
+              <a:gd name="adj" fmla="val 50000"/>
+            </a:avLst>
           </a:prstGeom>
           <a:ln/>
         </p:spPr>
@@ -4826,7 +4897,7 @@
           </a:fontRef>
         </p:style>
         <p:txBody>
-          <a:bodyPr rtlCol="0" anchor="t" anchorCtr="0"/>
+          <a:bodyPr lIns="45720" rIns="45720" rtlCol="0" anchor="ctr" anchorCtr="0"/>
           <a:lstStyle/>
           <a:p>
             <a:pPr algn="ctr"/>
@@ -4892,51 +4963,66 @@
           </a:p>
         </p:txBody>
       </p:sp>
-      <p:sp>
-        <p:nvSpPr>
-          <p:cNvPr id="85" name="Rounded Rectangle 84"/>
-          <p:cNvSpPr/>
+      <p:cxnSp>
+        <p:nvCxnSpPr>
+          <p:cNvPr id="39" name="Straight Connector 38"/>
+          <p:cNvCxnSpPr/>
           <p:nvPr/>
-        </p:nvSpPr>
+        </p:nvCxnSpPr>
         <p:spPr>
           <a:xfrm>
-            <a:off x="1828800" y="3829050"/>
-            <a:ext cx="762000" cy="495300"/>
-          </a:xfrm>
-          <a:prstGeom prst="roundRect">
+            <a:off x="2514600" y="3638550"/>
+            <a:ext cx="838200" cy="1183317"/>
+          </a:xfrm>
+          <a:prstGeom prst="line">
             <a:avLst/>
           </a:prstGeom>
-          <a:ln/>
         </p:spPr>
         <p:style>
-          <a:lnRef idx="2">
+          <a:lnRef idx="1">
             <a:schemeClr val="accent1"/>
           </a:lnRef>
-          <a:fillRef idx="1">
-            <a:schemeClr val="lt1"/>
+          <a:fillRef idx="0">
+            <a:schemeClr val="accent1"/>
           </a:fillRef>
           <a:effectRef idx="0">
             <a:schemeClr val="accent1"/>
           </a:effectRef>
           <a:fontRef idx="minor">
-            <a:schemeClr val="dk1"/>
+            <a:schemeClr val="tx1"/>
           </a:fontRef>
         </p:style>
-        <p:txBody>
-          <a:bodyPr rtlCol="0" anchor="t" anchorCtr="0"/>
-          <a:lstStyle/>
-          <a:p>
-            <a:pPr algn="ctr"/>
-            <a:endParaRPr lang="en-US" sz="1100" dirty="0">
-              <a:solidFill>
-                <a:schemeClr val="accent3">
-                  <a:lumMod val="50000"/>
-                </a:schemeClr>
-              </a:solidFill>
-            </a:endParaRPr>
-          </a:p>
-        </p:txBody>
-      </p:sp>
+      </p:cxnSp>
+      <p:cxnSp>
+        <p:nvCxnSpPr>
+          <p:cNvPr id="43" name="Straight Connector 42"/>
+          <p:cNvCxnSpPr/>
+          <p:nvPr/>
+        </p:nvCxnSpPr>
+        <p:spPr>
+          <a:xfrm>
+            <a:off x="2514600" y="3143250"/>
+            <a:ext cx="902081" cy="415924"/>
+          </a:xfrm>
+          <a:prstGeom prst="line">
+            <a:avLst/>
+          </a:prstGeom>
+        </p:spPr>
+        <p:style>
+          <a:lnRef idx="1">
+            <a:schemeClr val="accent1"/>
+          </a:lnRef>
+          <a:fillRef idx="0">
+            <a:schemeClr val="accent1"/>
+          </a:fillRef>
+          <a:effectRef idx="0">
+            <a:schemeClr val="accent1"/>
+          </a:effectRef>
+          <a:fontRef idx="minor">
+            <a:schemeClr val="tx1"/>
+          </a:fontRef>
+        </p:style>
+      </p:cxnSp>
     </p:spTree>
     <p:extLst>
       <p:ext uri="{BB962C8B-B14F-4D97-AF65-F5344CB8AC3E}">

</xml_diff>